<commit_message>
Final Changes to Presentation Notes
</commit_message>
<xml_diff>
--- a/Submissions/Dragons Den Pitch/DragonsDen Poster.pptx
+++ b/Submissions/Dragons Den Pitch/DragonsDen Poster.pptx
@@ -3235,7 +3235,10 @@
           <a:lstStyle/>
           <a:p>
             <a:pPr algn="ctr"/>
-            <a:endParaRPr lang="en-GB"/>
+            <a:r>
+              <a:rPr lang="en-GB" dirty="0" smtClean="0"/>
+              <a:t>WHAT CAN MEMORI DO?</a:t>
+            </a:r>
           </a:p>
         </p:txBody>
       </p:sp>
@@ -3247,8 +3250,8 @@
         </p:nvSpPr>
         <p:spPr>
           <a:xfrm>
-            <a:off x="0" y="4673600"/>
-            <a:ext cx="3727450" cy="2184400"/>
+            <a:off x="0" y="4718050"/>
+            <a:ext cx="2660650" cy="2139950"/>
           </a:xfrm>
           <a:prstGeom prst="rect">
             <a:avLst/>
@@ -3277,7 +3280,7 @@
             <a:pPr algn="ctr"/>
             <a:r>
               <a:rPr lang="en-GB" dirty="0" smtClean="0"/>
-              <a:t>SIMPLICITY IN NAVIGATION</a:t>
+              <a:t>IMAGE?</a:t>
             </a:r>
             <a:endParaRPr lang="en-GB" dirty="0"/>
           </a:p>
@@ -3321,18 +3324,7 @@
             <a:pPr algn="ctr"/>
             <a:r>
               <a:rPr lang="en-GB" dirty="0" smtClean="0"/>
-              <a:t>WHAT CAN MEMORI DO</a:t>
-            </a:r>
-          </a:p>
-          <a:p>
-            <a:pPr algn="ctr"/>
-            <a:endParaRPr lang="en-GB" dirty="0" smtClean="0"/>
-          </a:p>
-          <a:p>
-            <a:pPr algn="ctr"/>
-            <a:r>
-              <a:rPr lang="en-GB" dirty="0" smtClean="0"/>
-              <a:t>Memori lets you </a:t>
+              <a:t>IMAGE?</a:t>
             </a:r>
             <a:endParaRPr lang="en-GB" dirty="0" smtClean="0"/>
           </a:p>
@@ -3374,7 +3366,10 @@
           <a:lstStyle/>
           <a:p>
             <a:pPr algn="ctr"/>
-            <a:endParaRPr lang="en-GB"/>
+            <a:r>
+              <a:rPr lang="en-GB" dirty="0" smtClean="0"/>
+              <a:t>WHAT MAKES MEMORI THE BEST?</a:t>
+            </a:r>
           </a:p>
         </p:txBody>
       </p:sp>
@@ -3416,8 +3411,9 @@
             <a:pPr algn="ctr"/>
             <a:r>
               <a:rPr lang="en-GB" dirty="0" smtClean="0"/>
-              <a:t>WHY CHOOSE MEMORI</a:t>
-            </a:r>
+              <a:t>IMAGE?</a:t>
+            </a:r>
+            <a:endParaRPr lang="en-GB" dirty="0"/>
           </a:p>
         </p:txBody>
       </p:sp>
@@ -3429,8 +3425,8 @@
         </p:nvSpPr>
         <p:spPr>
           <a:xfrm>
-            <a:off x="3949701" y="4584700"/>
-            <a:ext cx="1822450" cy="2273300"/>
+            <a:off x="2927350" y="4584700"/>
+            <a:ext cx="2844801" cy="2273300"/>
           </a:xfrm>
           <a:prstGeom prst="rect">
             <a:avLst/>
@@ -3459,7 +3455,7 @@
             <a:pPr algn="ctr"/>
             <a:r>
               <a:rPr lang="en-GB" dirty="0" smtClean="0"/>
-              <a:t>LIGHT/DARK MODE</a:t>
+              <a:t>WHY CHOOSE MEMORI?</a:t>
             </a:r>
             <a:endParaRPr lang="en-GB" dirty="0"/>
           </a:p>
@@ -3503,32 +3499,12 @@
             <a:pPr algn="ctr"/>
             <a:r>
               <a:rPr lang="en-GB" dirty="0" smtClean="0"/>
-              <a:t>WHAT IS MEMORI</a:t>
-            </a:r>
-          </a:p>
-          <a:p>
-            <a:pPr algn="ctr"/>
-            <a:endParaRPr lang="en-GB" dirty="0" smtClean="0"/>
-          </a:p>
-          <a:p>
-            <a:pPr algn="ctr"/>
+              <a:t>WHAT IS </a:t>
+            </a:r>
             <a:r>
               <a:rPr lang="en-GB" dirty="0" smtClean="0"/>
-              <a:t>Memori will change the way you remember </a:t>
-            </a:r>
-            <a:r>
-              <a:rPr lang="en-GB" dirty="0" smtClean="0"/>
-              <a:t>and share holidays </a:t>
-            </a:r>
-            <a:r>
-              <a:rPr lang="en-GB" dirty="0" smtClean="0"/>
-              <a:t>forever</a:t>
-            </a:r>
-            <a:r>
-              <a:rPr lang="en-GB" dirty="0" smtClean="0"/>
-              <a:t>…  </a:t>
-            </a:r>
-            <a:endParaRPr lang="en-GB" dirty="0" smtClean="0"/>
+              <a:t>MEMORI</a:t>
+            </a:r>
           </a:p>
         </p:txBody>
       </p:sp>

</xml_diff>

<commit_message>
Continued Work on DragonsDen Pitch
Implemented colour schemes
- - - - -
Implemented text and structure for the text
- - - - -
Implemented a Dark/Light mode image, but still need to implement 3 other images
</commit_message>
<xml_diff>
--- a/Submissions/Dragons Den Pitch/DragonsDen Poster.pptx
+++ b/Submissions/Dragons Den Pitch/DragonsDen Poster.pptx
@@ -4,6 +4,9 @@
   <p:sldMasterIdLst>
     <p:sldMasterId id="2147483648" r:id="rId1"/>
   </p:sldMasterIdLst>
+  <p:notesMasterIdLst>
+    <p:notesMasterId r:id="rId3"/>
+  </p:notesMasterIdLst>
   <p:sldIdLst>
     <p:sldId id="256" r:id="rId2"/>
   </p:sldIdLst>
@@ -107,6 +110,434 @@
 </p:presentation>
 </file>
 
+<file path=ppt/notesMasters/notesMaster1.xml><?xml version="1.0" encoding="utf-8"?>
+<p:notesMaster xmlns:a="http://schemas.openxmlformats.org/drawingml/2006/main" xmlns:r="http://schemas.openxmlformats.org/officeDocument/2006/relationships" xmlns:p="http://schemas.openxmlformats.org/presentationml/2006/main">
+  <p:cSld>
+    <p:bg>
+      <p:bgRef idx="1001">
+        <a:schemeClr val="bg1"/>
+      </p:bgRef>
+    </p:bg>
+    <p:spTree>
+      <p:nvGrpSpPr>
+        <p:cNvPr id="1" name=""/>
+        <p:cNvGrpSpPr/>
+        <p:nvPr/>
+      </p:nvGrpSpPr>
+      <p:grpSpPr>
+        <a:xfrm>
+          <a:off x="0" y="0"/>
+          <a:ext cx="0" cy="0"/>
+          <a:chOff x="0" y="0"/>
+          <a:chExt cx="0" cy="0"/>
+        </a:xfrm>
+      </p:grpSpPr>
+      <p:sp>
+        <p:nvSpPr>
+          <p:cNvPr id="2" name="Header Placeholder 1"/>
+          <p:cNvSpPr>
+            <a:spLocks noGrp="1"/>
+          </p:cNvSpPr>
+          <p:nvPr>
+            <p:ph type="hdr" sz="quarter"/>
+          </p:nvPr>
+        </p:nvSpPr>
+        <p:spPr>
+          <a:xfrm>
+            <a:off x="0" y="0"/>
+            <a:ext cx="2971800" cy="457200"/>
+          </a:xfrm>
+          <a:prstGeom prst="rect">
+            <a:avLst/>
+          </a:prstGeom>
+        </p:spPr>
+        <p:txBody>
+          <a:bodyPr vert="horz" lIns="91440" tIns="45720" rIns="91440" bIns="45720" rtlCol="0"/>
+          <a:lstStyle>
+            <a:lvl1pPr algn="l">
+              <a:defRPr sz="1200"/>
+            </a:lvl1pPr>
+          </a:lstStyle>
+          <a:p>
+            <a:endParaRPr lang="en-GB"/>
+          </a:p>
+        </p:txBody>
+      </p:sp>
+      <p:sp>
+        <p:nvSpPr>
+          <p:cNvPr id="3" name="Date Placeholder 2"/>
+          <p:cNvSpPr>
+            <a:spLocks noGrp="1"/>
+          </p:cNvSpPr>
+          <p:nvPr>
+            <p:ph type="dt" idx="1"/>
+          </p:nvPr>
+        </p:nvSpPr>
+        <p:spPr>
+          <a:xfrm>
+            <a:off x="3884613" y="0"/>
+            <a:ext cx="2971800" cy="457200"/>
+          </a:xfrm>
+          <a:prstGeom prst="rect">
+            <a:avLst/>
+          </a:prstGeom>
+        </p:spPr>
+        <p:txBody>
+          <a:bodyPr vert="horz" lIns="91440" tIns="45720" rIns="91440" bIns="45720" rtlCol="0"/>
+          <a:lstStyle>
+            <a:lvl1pPr algn="r">
+              <a:defRPr sz="1200"/>
+            </a:lvl1pPr>
+          </a:lstStyle>
+          <a:p>
+            <a:fld id="{40DE2AF3-D3AF-4A03-A209-B7AB3FBB0B1D}" type="datetimeFigureOut">
+              <a:rPr lang="en-US" smtClean="0"/>
+              <a:t>11/9/2019</a:t>
+            </a:fld>
+            <a:endParaRPr lang="en-GB"/>
+          </a:p>
+        </p:txBody>
+      </p:sp>
+      <p:sp>
+        <p:nvSpPr>
+          <p:cNvPr id="4" name="Slide Image Placeholder 3"/>
+          <p:cNvSpPr>
+            <a:spLocks noGrp="1" noRot="1" noChangeAspect="1"/>
+          </p:cNvSpPr>
+          <p:nvPr>
+            <p:ph type="sldImg" idx="2"/>
+          </p:nvPr>
+        </p:nvSpPr>
+        <p:spPr>
+          <a:xfrm>
+            <a:off x="1143000" y="685800"/>
+            <a:ext cx="4572000" cy="3429000"/>
+          </a:xfrm>
+          <a:prstGeom prst="rect">
+            <a:avLst/>
+          </a:prstGeom>
+          <a:noFill/>
+          <a:ln w="12700">
+            <a:solidFill>
+              <a:prstClr val="black"/>
+            </a:solidFill>
+          </a:ln>
+        </p:spPr>
+        <p:txBody>
+          <a:bodyPr vert="horz" lIns="91440" tIns="45720" rIns="91440" bIns="45720" rtlCol="0" anchor="ctr"/>
+          <a:lstStyle/>
+          <a:p>
+            <a:endParaRPr lang="en-GB"/>
+          </a:p>
+        </p:txBody>
+      </p:sp>
+      <p:sp>
+        <p:nvSpPr>
+          <p:cNvPr id="5" name="Notes Placeholder 4"/>
+          <p:cNvSpPr>
+            <a:spLocks noGrp="1"/>
+          </p:cNvSpPr>
+          <p:nvPr>
+            <p:ph type="body" sz="quarter" idx="3"/>
+          </p:nvPr>
+        </p:nvSpPr>
+        <p:spPr>
+          <a:xfrm>
+            <a:off x="685800" y="4343400"/>
+            <a:ext cx="5486400" cy="4114800"/>
+          </a:xfrm>
+          <a:prstGeom prst="rect">
+            <a:avLst/>
+          </a:prstGeom>
+        </p:spPr>
+        <p:txBody>
+          <a:bodyPr vert="horz" lIns="91440" tIns="45720" rIns="91440" bIns="45720" rtlCol="0">
+            <a:normAutofit/>
+          </a:bodyPr>
+          <a:lstStyle/>
+          <a:p>
+            <a:pPr lvl="0"/>
+            <a:r>
+              <a:rPr lang="en-US" smtClean="0"/>
+              <a:t>Click to edit Master text styles</a:t>
+            </a:r>
+          </a:p>
+          <a:p>
+            <a:pPr lvl="1"/>
+            <a:r>
+              <a:rPr lang="en-US" smtClean="0"/>
+              <a:t>Second level</a:t>
+            </a:r>
+          </a:p>
+          <a:p>
+            <a:pPr lvl="2"/>
+            <a:r>
+              <a:rPr lang="en-US" smtClean="0"/>
+              <a:t>Third level</a:t>
+            </a:r>
+          </a:p>
+          <a:p>
+            <a:pPr lvl="3"/>
+            <a:r>
+              <a:rPr lang="en-US" smtClean="0"/>
+              <a:t>Fourth level</a:t>
+            </a:r>
+          </a:p>
+          <a:p>
+            <a:pPr lvl="4"/>
+            <a:r>
+              <a:rPr lang="en-US" smtClean="0"/>
+              <a:t>Fifth level</a:t>
+            </a:r>
+            <a:endParaRPr lang="en-GB"/>
+          </a:p>
+        </p:txBody>
+      </p:sp>
+      <p:sp>
+        <p:nvSpPr>
+          <p:cNvPr id="6" name="Footer Placeholder 5"/>
+          <p:cNvSpPr>
+            <a:spLocks noGrp="1"/>
+          </p:cNvSpPr>
+          <p:nvPr>
+            <p:ph type="ftr" sz="quarter" idx="4"/>
+          </p:nvPr>
+        </p:nvSpPr>
+        <p:spPr>
+          <a:xfrm>
+            <a:off x="0" y="8685213"/>
+            <a:ext cx="2971800" cy="457200"/>
+          </a:xfrm>
+          <a:prstGeom prst="rect">
+            <a:avLst/>
+          </a:prstGeom>
+        </p:spPr>
+        <p:txBody>
+          <a:bodyPr vert="horz" lIns="91440" tIns="45720" rIns="91440" bIns="45720" rtlCol="0" anchor="b"/>
+          <a:lstStyle>
+            <a:lvl1pPr algn="l">
+              <a:defRPr sz="1200"/>
+            </a:lvl1pPr>
+          </a:lstStyle>
+          <a:p>
+            <a:endParaRPr lang="en-GB"/>
+          </a:p>
+        </p:txBody>
+      </p:sp>
+      <p:sp>
+        <p:nvSpPr>
+          <p:cNvPr id="7" name="Slide Number Placeholder 6"/>
+          <p:cNvSpPr>
+            <a:spLocks noGrp="1"/>
+          </p:cNvSpPr>
+          <p:nvPr>
+            <p:ph type="sldNum" sz="quarter" idx="5"/>
+          </p:nvPr>
+        </p:nvSpPr>
+        <p:spPr>
+          <a:xfrm>
+            <a:off x="3884613" y="8685213"/>
+            <a:ext cx="2971800" cy="457200"/>
+          </a:xfrm>
+          <a:prstGeom prst="rect">
+            <a:avLst/>
+          </a:prstGeom>
+        </p:spPr>
+        <p:txBody>
+          <a:bodyPr vert="horz" lIns="91440" tIns="45720" rIns="91440" bIns="45720" rtlCol="0" anchor="b"/>
+          <a:lstStyle>
+            <a:lvl1pPr algn="r">
+              <a:defRPr sz="1200"/>
+            </a:lvl1pPr>
+          </a:lstStyle>
+          <a:p>
+            <a:fld id="{B20760FC-AD33-4243-8141-1CC7245074A9}" type="slidenum">
+              <a:rPr lang="en-GB" smtClean="0"/>
+              <a:t>‹#›</a:t>
+            </a:fld>
+            <a:endParaRPr lang="en-GB"/>
+          </a:p>
+        </p:txBody>
+      </p:sp>
+    </p:spTree>
+  </p:cSld>
+  <p:clrMap bg1="lt1" tx1="dk1" bg2="lt2" tx2="dk2" accent1="accent1" accent2="accent2" accent3="accent3" accent4="accent4" accent5="accent5" accent6="accent6" hlink="hlink" folHlink="folHlink"/>
+  <p:notesStyle>
+    <a:lvl1pPr marL="0" algn="l" defTabSz="914400" rtl="0" eaLnBrk="1" latinLnBrk="0" hangingPunct="1">
+      <a:defRPr sz="1200" kern="1200">
+        <a:solidFill>
+          <a:schemeClr val="tx1"/>
+        </a:solidFill>
+        <a:latin typeface="+mn-lt"/>
+        <a:ea typeface="+mn-ea"/>
+        <a:cs typeface="+mn-cs"/>
+      </a:defRPr>
+    </a:lvl1pPr>
+    <a:lvl2pPr marL="457200" algn="l" defTabSz="914400" rtl="0" eaLnBrk="1" latinLnBrk="0" hangingPunct="1">
+      <a:defRPr sz="1200" kern="1200">
+        <a:solidFill>
+          <a:schemeClr val="tx1"/>
+        </a:solidFill>
+        <a:latin typeface="+mn-lt"/>
+        <a:ea typeface="+mn-ea"/>
+        <a:cs typeface="+mn-cs"/>
+      </a:defRPr>
+    </a:lvl2pPr>
+    <a:lvl3pPr marL="914400" algn="l" defTabSz="914400" rtl="0" eaLnBrk="1" latinLnBrk="0" hangingPunct="1">
+      <a:defRPr sz="1200" kern="1200">
+        <a:solidFill>
+          <a:schemeClr val="tx1"/>
+        </a:solidFill>
+        <a:latin typeface="+mn-lt"/>
+        <a:ea typeface="+mn-ea"/>
+        <a:cs typeface="+mn-cs"/>
+      </a:defRPr>
+    </a:lvl3pPr>
+    <a:lvl4pPr marL="1371600" algn="l" defTabSz="914400" rtl="0" eaLnBrk="1" latinLnBrk="0" hangingPunct="1">
+      <a:defRPr sz="1200" kern="1200">
+        <a:solidFill>
+          <a:schemeClr val="tx1"/>
+        </a:solidFill>
+        <a:latin typeface="+mn-lt"/>
+        <a:ea typeface="+mn-ea"/>
+        <a:cs typeface="+mn-cs"/>
+      </a:defRPr>
+    </a:lvl4pPr>
+    <a:lvl5pPr marL="1828800" algn="l" defTabSz="914400" rtl="0" eaLnBrk="1" latinLnBrk="0" hangingPunct="1">
+      <a:defRPr sz="1200" kern="1200">
+        <a:solidFill>
+          <a:schemeClr val="tx1"/>
+        </a:solidFill>
+        <a:latin typeface="+mn-lt"/>
+        <a:ea typeface="+mn-ea"/>
+        <a:cs typeface="+mn-cs"/>
+      </a:defRPr>
+    </a:lvl5pPr>
+    <a:lvl6pPr marL="2286000" algn="l" defTabSz="914400" rtl="0" eaLnBrk="1" latinLnBrk="0" hangingPunct="1">
+      <a:defRPr sz="1200" kern="1200">
+        <a:solidFill>
+          <a:schemeClr val="tx1"/>
+        </a:solidFill>
+        <a:latin typeface="+mn-lt"/>
+        <a:ea typeface="+mn-ea"/>
+        <a:cs typeface="+mn-cs"/>
+      </a:defRPr>
+    </a:lvl6pPr>
+    <a:lvl7pPr marL="2743200" algn="l" defTabSz="914400" rtl="0" eaLnBrk="1" latinLnBrk="0" hangingPunct="1">
+      <a:defRPr sz="1200" kern="1200">
+        <a:solidFill>
+          <a:schemeClr val="tx1"/>
+        </a:solidFill>
+        <a:latin typeface="+mn-lt"/>
+        <a:ea typeface="+mn-ea"/>
+        <a:cs typeface="+mn-cs"/>
+      </a:defRPr>
+    </a:lvl7pPr>
+    <a:lvl8pPr marL="3200400" algn="l" defTabSz="914400" rtl="0" eaLnBrk="1" latinLnBrk="0" hangingPunct="1">
+      <a:defRPr sz="1200" kern="1200">
+        <a:solidFill>
+          <a:schemeClr val="tx1"/>
+        </a:solidFill>
+        <a:latin typeface="+mn-lt"/>
+        <a:ea typeface="+mn-ea"/>
+        <a:cs typeface="+mn-cs"/>
+      </a:defRPr>
+    </a:lvl8pPr>
+    <a:lvl9pPr marL="3657600" algn="l" defTabSz="914400" rtl="0" eaLnBrk="1" latinLnBrk="0" hangingPunct="1">
+      <a:defRPr sz="1200" kern="1200">
+        <a:solidFill>
+          <a:schemeClr val="tx1"/>
+        </a:solidFill>
+        <a:latin typeface="+mn-lt"/>
+        <a:ea typeface="+mn-ea"/>
+        <a:cs typeface="+mn-cs"/>
+      </a:defRPr>
+    </a:lvl9pPr>
+  </p:notesStyle>
+</p:notesMaster>
+</file>
+
+<file path=ppt/notesSlides/notesSlide1.xml><?xml version="1.0" encoding="utf-8"?>
+<p:notes xmlns:a="http://schemas.openxmlformats.org/drawingml/2006/main" xmlns:r="http://schemas.openxmlformats.org/officeDocument/2006/relationships" xmlns:p="http://schemas.openxmlformats.org/presentationml/2006/main">
+  <p:cSld>
+    <p:spTree>
+      <p:nvGrpSpPr>
+        <p:cNvPr id="1" name=""/>
+        <p:cNvGrpSpPr/>
+        <p:nvPr/>
+      </p:nvGrpSpPr>
+      <p:grpSpPr>
+        <a:xfrm>
+          <a:off x="0" y="0"/>
+          <a:ext cx="0" cy="0"/>
+          <a:chOff x="0" y="0"/>
+          <a:chExt cx="0" cy="0"/>
+        </a:xfrm>
+      </p:grpSpPr>
+      <p:sp>
+        <p:nvSpPr>
+          <p:cNvPr id="2" name="Slide Image Placeholder 1"/>
+          <p:cNvSpPr>
+            <a:spLocks noGrp="1" noRot="1" noChangeAspect="1"/>
+          </p:cNvSpPr>
+          <p:nvPr>
+            <p:ph type="sldImg"/>
+          </p:nvPr>
+        </p:nvSpPr>
+        <p:spPr/>
+      </p:sp>
+      <p:sp>
+        <p:nvSpPr>
+          <p:cNvPr id="3" name="Notes Placeholder 2"/>
+          <p:cNvSpPr>
+            <a:spLocks noGrp="1"/>
+          </p:cNvSpPr>
+          <p:nvPr>
+            <p:ph type="body" idx="1"/>
+          </p:nvPr>
+        </p:nvSpPr>
+        <p:spPr/>
+        <p:txBody>
+          <a:bodyPr>
+            <a:normAutofit/>
+          </a:bodyPr>
+          <a:lstStyle/>
+          <a:p>
+            <a:endParaRPr lang="en-GB" dirty="0"/>
+          </a:p>
+        </p:txBody>
+      </p:sp>
+      <p:sp>
+        <p:nvSpPr>
+          <p:cNvPr id="4" name="Slide Number Placeholder 3"/>
+          <p:cNvSpPr>
+            <a:spLocks noGrp="1"/>
+          </p:cNvSpPr>
+          <p:nvPr>
+            <p:ph type="sldNum" sz="quarter" idx="10"/>
+          </p:nvPr>
+        </p:nvSpPr>
+        <p:spPr/>
+        <p:txBody>
+          <a:bodyPr/>
+          <a:lstStyle/>
+          <a:p>
+            <a:fld id="{B20760FC-AD33-4243-8141-1CC7245074A9}" type="slidenum">
+              <a:rPr lang="en-GB" smtClean="0"/>
+              <a:t>1</a:t>
+            </a:fld>
+            <a:endParaRPr lang="en-GB"/>
+          </a:p>
+        </p:txBody>
+      </p:sp>
+    </p:spTree>
+  </p:cSld>
+  <p:clrMapOvr>
+    <a:masterClrMapping/>
+  </p:clrMapOvr>
+</p:notes>
+</file>
+
 <file path=ppt/slideLayouts/slideLayout1.xml><?xml version="1.0" encoding="utf-8"?>
 <p:sldLayout xmlns:a="http://schemas.openxmlformats.org/drawingml/2006/main" xmlns:r="http://schemas.openxmlformats.org/officeDocument/2006/relationships" xmlns:p="http://schemas.openxmlformats.org/presentationml/2006/main" type="title" preserve="1">
   <p:cSld name="Title Slide">
@@ -289,7 +720,7 @@
             <a:fld id="{6296F0A8-CC51-48EC-9789-803E166570BF}" type="datetimeFigureOut">
               <a:rPr lang="en-US" smtClean="0"/>
               <a:pPr/>
-              <a:t>11/7/2019</a:t>
+              <a:t>11/9/2019</a:t>
             </a:fld>
             <a:endParaRPr lang="en-GB"/>
           </a:p>
@@ -456,7 +887,7 @@
             <a:fld id="{6296F0A8-CC51-48EC-9789-803E166570BF}" type="datetimeFigureOut">
               <a:rPr lang="en-US" smtClean="0"/>
               <a:pPr/>
-              <a:t>11/7/2019</a:t>
+              <a:t>11/9/2019</a:t>
             </a:fld>
             <a:endParaRPr lang="en-GB"/>
           </a:p>
@@ -633,7 +1064,7 @@
             <a:fld id="{6296F0A8-CC51-48EC-9789-803E166570BF}" type="datetimeFigureOut">
               <a:rPr lang="en-US" smtClean="0"/>
               <a:pPr/>
-              <a:t>11/7/2019</a:t>
+              <a:t>11/9/2019</a:t>
             </a:fld>
             <a:endParaRPr lang="en-GB"/>
           </a:p>
@@ -800,7 +1231,7 @@
             <a:fld id="{6296F0A8-CC51-48EC-9789-803E166570BF}" type="datetimeFigureOut">
               <a:rPr lang="en-US" smtClean="0"/>
               <a:pPr/>
-              <a:t>11/7/2019</a:t>
+              <a:t>11/9/2019</a:t>
             </a:fld>
             <a:endParaRPr lang="en-GB"/>
           </a:p>
@@ -1043,7 +1474,7 @@
             <a:fld id="{6296F0A8-CC51-48EC-9789-803E166570BF}" type="datetimeFigureOut">
               <a:rPr lang="en-US" smtClean="0"/>
               <a:pPr/>
-              <a:t>11/7/2019</a:t>
+              <a:t>11/9/2019</a:t>
             </a:fld>
             <a:endParaRPr lang="en-GB"/>
           </a:p>
@@ -1328,7 +1759,7 @@
             <a:fld id="{6296F0A8-CC51-48EC-9789-803E166570BF}" type="datetimeFigureOut">
               <a:rPr lang="en-US" smtClean="0"/>
               <a:pPr/>
-              <a:t>11/7/2019</a:t>
+              <a:t>11/9/2019</a:t>
             </a:fld>
             <a:endParaRPr lang="en-GB"/>
           </a:p>
@@ -1747,7 +2178,7 @@
             <a:fld id="{6296F0A8-CC51-48EC-9789-803E166570BF}" type="datetimeFigureOut">
               <a:rPr lang="en-US" smtClean="0"/>
               <a:pPr/>
-              <a:t>11/7/2019</a:t>
+              <a:t>11/9/2019</a:t>
             </a:fld>
             <a:endParaRPr lang="en-GB"/>
           </a:p>
@@ -1862,7 +2293,7 @@
             <a:fld id="{6296F0A8-CC51-48EC-9789-803E166570BF}" type="datetimeFigureOut">
               <a:rPr lang="en-US" smtClean="0"/>
               <a:pPr/>
-              <a:t>11/7/2019</a:t>
+              <a:t>11/9/2019</a:t>
             </a:fld>
             <a:endParaRPr lang="en-GB"/>
           </a:p>
@@ -1954,7 +2385,7 @@
             <a:fld id="{6296F0A8-CC51-48EC-9789-803E166570BF}" type="datetimeFigureOut">
               <a:rPr lang="en-US" smtClean="0"/>
               <a:pPr/>
-              <a:t>11/7/2019</a:t>
+              <a:t>11/9/2019</a:t>
             </a:fld>
             <a:endParaRPr lang="en-GB"/>
           </a:p>
@@ -2228,7 +2659,7 @@
             <a:fld id="{6296F0A8-CC51-48EC-9789-803E166570BF}" type="datetimeFigureOut">
               <a:rPr lang="en-US" smtClean="0"/>
               <a:pPr/>
-              <a:t>11/7/2019</a:t>
+              <a:t>11/9/2019</a:t>
             </a:fld>
             <a:endParaRPr lang="en-GB"/>
           </a:p>
@@ -2478,7 +2909,7 @@
             <a:fld id="{6296F0A8-CC51-48EC-9789-803E166570BF}" type="datetimeFigureOut">
               <a:rPr lang="en-US" smtClean="0"/>
               <a:pPr/>
-              <a:t>11/7/2019</a:t>
+              <a:t>11/9/2019</a:t>
             </a:fld>
             <a:endParaRPr lang="en-GB"/>
           </a:p>
@@ -2539,12 +2970,9 @@
 <p:sldMaster xmlns:a="http://schemas.openxmlformats.org/drawingml/2006/main" xmlns:r="http://schemas.openxmlformats.org/officeDocument/2006/relationships" xmlns:p="http://schemas.openxmlformats.org/presentationml/2006/main">
   <p:cSld>
     <p:bg>
-      <p:bgPr>
-        <a:solidFill>
-          <a:srgbClr val="F0F0F0"/>
-        </a:solidFill>
-        <a:effectLst/>
-      </p:bgPr>
+      <p:bgRef idx="1003">
+        <a:schemeClr val="bg2"/>
+      </p:bgRef>
     </p:bg>
     <p:spTree>
       <p:nvGrpSpPr>
@@ -2691,7 +3119,7 @@
             <a:fld id="{6296F0A8-CC51-48EC-9789-803E166570BF}" type="datetimeFigureOut">
               <a:rPr lang="en-US" smtClean="0"/>
               <a:pPr/>
-              <a:t>11/7/2019</a:t>
+              <a:t>11/9/2019</a:t>
             </a:fld>
             <a:endParaRPr lang="en-GB"/>
           </a:p>
@@ -2778,7 +3206,7 @@
       </p:sp>
     </p:spTree>
   </p:cSld>
-  <p:clrMap bg1="lt1" tx1="dk1" bg2="lt2" tx2="dk2" accent1="accent1" accent2="accent2" accent3="accent3" accent4="accent4" accent5="accent5" accent6="accent6" hlink="hlink" folHlink="folHlink"/>
+  <p:clrMap bg1="dk1" tx1="lt1" bg2="dk2" tx2="lt2" accent1="accent1" accent2="accent2" accent3="accent3" accent4="accent4" accent5="accent5" accent6="accent6" hlink="hlink" folHlink="folHlink"/>
   <p:sldLayoutIdLst>
     <p:sldLayoutId id="2147483649" r:id="rId1"/>
     <p:sldLayoutId id="2147483650" r:id="rId2"/>
@@ -3106,7 +3534,7 @@
         </p:nvSpPr>
         <p:spPr>
           <a:xfrm>
-            <a:off x="3594086" y="3429000"/>
+            <a:off x="3549650" y="3429000"/>
             <a:ext cx="2000264" cy="357189"/>
           </a:xfrm>
           <a:prstGeom prst="rect">
@@ -3142,7 +3570,9 @@
                   <a:noFill/>
                 </a:ln>
                 <a:solidFill>
-                  <a:srgbClr val="999999"/>
+                  <a:schemeClr val="tx1">
+                    <a:lumMod val="75000"/>
+                  </a:schemeClr>
                 </a:solidFill>
                 <a:effectLst/>
                 <a:uLnTx/>
@@ -3151,7 +3581,26 @@
                 <a:ea typeface="+mj-ea"/>
                 <a:cs typeface="Arial" pitchFamily="34" charset="0"/>
               </a:rPr>
-              <a:t>BY BHAVEN PATEL</a:t>
+              <a:t>BY BHAVEN </a:t>
+            </a:r>
+            <a:r>
+              <a:rPr kumimoji="0" lang="en-GB" sz="4400" b="1" i="0" u="none" strike="noStrike" kern="1200" cap="none" spc="0" normalizeH="0" baseline="0" noProof="0" dirty="0" smtClean="0">
+                <a:ln>
+                  <a:noFill/>
+                </a:ln>
+                <a:solidFill>
+                  <a:schemeClr val="tx1">
+                    <a:lumMod val="75000"/>
+                  </a:schemeClr>
+                </a:solidFill>
+                <a:effectLst/>
+                <a:uLnTx/>
+                <a:uFillTx/>
+                <a:latin typeface="Arial Rounded MT Bold" pitchFamily="34" charset="0"/>
+                <a:ea typeface="+mj-ea"/>
+                <a:cs typeface="Arial" pitchFamily="34" charset="0"/>
+              </a:rPr>
+              <a:t>PATEL</a:t>
             </a:r>
           </a:p>
         </p:txBody>
@@ -3164,8 +3613,8 @@
         </p:nvSpPr>
         <p:spPr>
           <a:xfrm>
-            <a:off x="0" y="0"/>
-            <a:ext cx="2660650" cy="2273300"/>
+            <a:off x="660400" y="0"/>
+            <a:ext cx="1993901" cy="1917700"/>
           </a:xfrm>
           <a:prstGeom prst="rect">
             <a:avLst/>
@@ -3201,14 +3650,14 @@
       </p:sp>
       <p:sp>
         <p:nvSpPr>
-          <p:cNvPr id="6" name="Rectangle 5"/>
+          <p:cNvPr id="8" name="Rectangle 7"/>
           <p:cNvSpPr/>
           <p:nvPr/>
         </p:nvSpPr>
         <p:spPr>
           <a:xfrm>
-            <a:off x="0" y="2451100"/>
-            <a:ext cx="3060700" cy="2000250"/>
+            <a:off x="6750050" y="5651501"/>
+            <a:ext cx="1600199" cy="1206500"/>
           </a:xfrm>
           <a:prstGeom prst="rect">
             <a:avLst/>
@@ -3237,21 +3686,21 @@
             <a:pPr algn="ctr"/>
             <a:r>
               <a:rPr lang="en-GB" dirty="0" smtClean="0"/>
-              <a:t>WHAT CAN MEMORI DO?</a:t>
-            </a:r>
-          </a:p>
-        </p:txBody>
-      </p:sp>
-      <p:sp>
-        <p:nvSpPr>
-          <p:cNvPr id="7" name="Rectangle 6"/>
+              <a:t>IMAGE?</a:t>
+            </a:r>
+          </a:p>
+        </p:txBody>
+      </p:sp>
+      <p:sp>
+        <p:nvSpPr>
+          <p:cNvPr id="11" name="Rectangle 10"/>
           <p:cNvSpPr/>
           <p:nvPr/>
         </p:nvSpPr>
         <p:spPr>
           <a:xfrm>
-            <a:off x="0" y="4718050"/>
-            <a:ext cx="2660650" cy="2139950"/>
+            <a:off x="660400" y="5295900"/>
+            <a:ext cx="1733550" cy="1562101"/>
           </a:xfrm>
           <a:prstGeom prst="rect">
             <a:avLst/>
@@ -3286,233 +3735,732 @@
           </a:p>
         </p:txBody>
       </p:sp>
-      <p:sp>
-        <p:nvSpPr>
-          <p:cNvPr id="8" name="Rectangle 7"/>
-          <p:cNvSpPr/>
+      <p:pic>
+        <p:nvPicPr>
+          <p:cNvPr id="1028" name="Picture 4"/>
+          <p:cNvPicPr>
+            <a:picLocks noChangeAspect="1" noChangeArrowheads="1"/>
+          </p:cNvPicPr>
           <p:nvPr/>
-        </p:nvSpPr>
-        <p:spPr>
+        </p:nvPicPr>
+        <p:blipFill>
+          <a:blip r:embed="rId3" cstate="print"/>
+          <a:srcRect r="651" b="814"/>
+          <a:stretch>
+            <a:fillRect/>
+          </a:stretch>
+        </p:blipFill>
+        <p:spPr bwMode="auto">
           <a:xfrm>
-            <a:off x="5772151" y="0"/>
-            <a:ext cx="3371850" cy="1695450"/>
+            <a:off x="7105650" y="-15986"/>
+            <a:ext cx="1431095" cy="1428750"/>
           </a:xfrm>
-          <a:prstGeom prst="rect">
-            <a:avLst/>
+          <a:prstGeom prst="roundRect">
+            <a:avLst>
+              <a:gd name="adj" fmla="val 8594"/>
+            </a:avLst>
           </a:prstGeom>
+          <a:solidFill>
+            <a:srgbClr val="FFFFFF">
+              <a:shade val="85000"/>
+            </a:srgbClr>
+          </a:solidFill>
+          <a:ln>
+            <a:noFill/>
+          </a:ln>
+          <a:effectLst>
+            <a:outerShdw blurRad="50800" dist="38100" dir="8100000" algn="tr" rotWithShape="0">
+              <a:prstClr val="black">
+                <a:alpha val="40000"/>
+              </a:prstClr>
+            </a:outerShdw>
+          </a:effectLst>
         </p:spPr>
-        <p:style>
-          <a:lnRef idx="2">
-            <a:schemeClr val="accent1">
-              <a:shade val="50000"/>
-            </a:schemeClr>
-          </a:lnRef>
-          <a:fillRef idx="1">
-            <a:schemeClr val="accent1"/>
-          </a:fillRef>
-          <a:effectRef idx="0">
-            <a:schemeClr val="accent1"/>
-          </a:effectRef>
-          <a:fontRef idx="minor">
-            <a:schemeClr val="lt1"/>
-          </a:fontRef>
-        </p:style>
-        <p:txBody>
-          <a:bodyPr rtlCol="0" anchor="ctr"/>
-          <a:lstStyle/>
-          <a:p>
-            <a:pPr algn="ctr"/>
-            <a:r>
-              <a:rPr lang="en-GB" dirty="0" smtClean="0"/>
-              <a:t>IMAGE?</a:t>
-            </a:r>
-            <a:endParaRPr lang="en-GB" dirty="0" smtClean="0"/>
-          </a:p>
-        </p:txBody>
-      </p:sp>
-      <p:sp>
-        <p:nvSpPr>
-          <p:cNvPr id="9" name="Rectangle 8"/>
-          <p:cNvSpPr/>
+      </p:pic>
+      <p:grpSp>
+        <p:nvGrpSpPr>
+          <p:cNvPr id="32" name="Group 31"/>
+          <p:cNvGrpSpPr/>
           <p:nvPr/>
-        </p:nvSpPr>
-        <p:spPr>
+        </p:nvGrpSpPr>
+        <p:grpSpPr>
           <a:xfrm>
-            <a:off x="6083300" y="1897062"/>
-            <a:ext cx="3060701" cy="3206750"/>
+            <a:off x="3140424" y="-38100"/>
+            <a:ext cx="3076226" cy="2297972"/>
+            <a:chOff x="3140424" y="-37368"/>
+            <a:chExt cx="3209576" cy="2132870"/>
           </a:xfrm>
-          <a:prstGeom prst="rect">
-            <a:avLst/>
-          </a:prstGeom>
-        </p:spPr>
-        <p:style>
-          <a:lnRef idx="2">
-            <a:schemeClr val="accent1">
-              <a:shade val="50000"/>
-            </a:schemeClr>
-          </a:lnRef>
-          <a:fillRef idx="1">
-            <a:schemeClr val="accent1"/>
-          </a:fillRef>
-          <a:effectRef idx="0">
-            <a:schemeClr val="accent1"/>
-          </a:effectRef>
-          <a:fontRef idx="minor">
-            <a:schemeClr val="lt1"/>
-          </a:fontRef>
-        </p:style>
-        <p:txBody>
-          <a:bodyPr rtlCol="0" anchor="ctr"/>
-          <a:lstStyle/>
-          <a:p>
-            <a:pPr algn="ctr"/>
-            <a:r>
-              <a:rPr lang="en-GB" dirty="0" smtClean="0"/>
-              <a:t>WHAT MAKES MEMORI THE BEST?</a:t>
-            </a:r>
-          </a:p>
-        </p:txBody>
-      </p:sp>
-      <p:sp>
-        <p:nvSpPr>
-          <p:cNvPr id="11" name="Rectangle 10"/>
-          <p:cNvSpPr/>
+        </p:grpSpPr>
+        <p:sp>
+          <p:nvSpPr>
+            <p:cNvPr id="14" name="Rounded Rectangle 13"/>
+            <p:cNvSpPr/>
+            <p:nvPr/>
+          </p:nvSpPr>
+          <p:spPr>
+            <a:xfrm>
+              <a:off x="3318224" y="-16843"/>
+              <a:ext cx="2942876" cy="2112345"/>
+            </a:xfrm>
+            <a:prstGeom prst="roundRect">
+              <a:avLst/>
+            </a:prstGeom>
+            <a:gradFill flip="none" rotWithShape="1">
+              <a:gsLst>
+                <a:gs pos="0">
+                  <a:schemeClr val="lt1">
+                    <a:shade val="30000"/>
+                    <a:satMod val="115000"/>
+                  </a:schemeClr>
+                </a:gs>
+                <a:gs pos="50000">
+                  <a:schemeClr val="lt1">
+                    <a:shade val="67500"/>
+                    <a:satMod val="115000"/>
+                  </a:schemeClr>
+                </a:gs>
+                <a:gs pos="100000">
+                  <a:schemeClr val="lt1">
+                    <a:shade val="100000"/>
+                    <a:satMod val="115000"/>
+                  </a:schemeClr>
+                </a:gs>
+              </a:gsLst>
+              <a:lin ang="5400000" scaled="1"/>
+              <a:tileRect/>
+            </a:gradFill>
+            <a:scene3d>
+              <a:camera prst="orthographicFront"/>
+              <a:lightRig rig="threePt" dir="t"/>
+            </a:scene3d>
+            <a:sp3d>
+              <a:bevelT prst="angle"/>
+            </a:sp3d>
+          </p:spPr>
+          <p:style>
+            <a:lnRef idx="2">
+              <a:schemeClr val="dk1"/>
+            </a:lnRef>
+            <a:fillRef idx="1">
+              <a:schemeClr val="lt1"/>
+            </a:fillRef>
+            <a:effectRef idx="0">
+              <a:schemeClr val="dk1"/>
+            </a:effectRef>
+            <a:fontRef idx="minor">
+              <a:schemeClr val="dk1"/>
+            </a:fontRef>
+          </p:style>
+          <p:txBody>
+            <a:bodyPr rtlCol="0" anchor="t"/>
+            <a:lstStyle/>
+            <a:p>
+              <a:pPr algn="ctr"/>
+              <a:endParaRPr lang="en-GB" sz="2400" dirty="0" smtClean="0"/>
+            </a:p>
+            <a:p>
+              <a:pPr algn="ctr"/>
+              <a:r>
+                <a:rPr lang="en-GB" sz="1400" dirty="0" smtClean="0"/>
+                <a:t>Memori is a travel journal  app designed to keep your treasured memories safe. You’ll no longer store everything about your holiday in several places, as Memori will sort it for your from the comfort of your own hands!</a:t>
+              </a:r>
+              <a:endParaRPr lang="en-GB" sz="1400" dirty="0" smtClean="0"/>
+            </a:p>
+          </p:txBody>
+        </p:sp>
+        <p:sp>
+          <p:nvSpPr>
+            <p:cNvPr id="17" name="Rectangle 16"/>
+            <p:cNvSpPr/>
+            <p:nvPr/>
+          </p:nvSpPr>
+          <p:spPr>
+            <a:xfrm>
+              <a:off x="3140424" y="-37368"/>
+              <a:ext cx="3209576" cy="474080"/>
+            </a:xfrm>
+            <a:prstGeom prst="roundRect">
+              <a:avLst/>
+            </a:prstGeom>
+            <a:noFill/>
+            <a:ln>
+              <a:noFill/>
+            </a:ln>
+            <a:scene3d>
+              <a:camera prst="orthographicFront"/>
+              <a:lightRig rig="threePt" dir="t"/>
+            </a:scene3d>
+            <a:sp3d>
+              <a:bevelT prst="angle"/>
+            </a:sp3d>
+          </p:spPr>
+          <p:txBody>
+            <a:bodyPr wrap="square" lIns="91440" tIns="45720" rIns="91440" bIns="45720">
+              <a:spAutoFit/>
+            </a:bodyPr>
+            <a:lstStyle/>
+            <a:p>
+              <a:pPr algn="ctr"/>
+              <a:r>
+                <a:rPr lang="en-US" sz="2400" dirty="0" smtClean="0">
+                  <a:ln w="18415" cmpd="sng">
+                    <a:solidFill>
+                      <a:srgbClr val="FFFFFF"/>
+                    </a:solidFill>
+                    <a:prstDash val="solid"/>
+                  </a:ln>
+                  <a:solidFill>
+                    <a:srgbClr val="FFFFFF"/>
+                  </a:solidFill>
+                  <a:effectLst>
+                    <a:outerShdw blurRad="63500" dir="3600000" algn="tl" rotWithShape="0">
+                      <a:srgbClr val="000000">
+                        <a:alpha val="70000"/>
+                      </a:srgbClr>
+                    </a:outerShdw>
+                  </a:effectLst>
+                </a:rPr>
+                <a:t>What is Memori?</a:t>
+              </a:r>
+              <a:endParaRPr lang="en-US" sz="2400" dirty="0">
+                <a:ln w="18415" cmpd="sng">
+                  <a:solidFill>
+                    <a:srgbClr val="FFFFFF"/>
+                  </a:solidFill>
+                  <a:prstDash val="solid"/>
+                </a:ln>
+                <a:solidFill>
+                  <a:srgbClr val="FFFFFF"/>
+                </a:solidFill>
+                <a:effectLst>
+                  <a:outerShdw blurRad="63500" dir="3600000" algn="tl" rotWithShape="0">
+                    <a:srgbClr val="000000">
+                      <a:alpha val="70000"/>
+                    </a:srgbClr>
+                  </a:outerShdw>
+                </a:effectLst>
+              </a:endParaRPr>
+            </a:p>
+          </p:txBody>
+        </p:sp>
+      </p:grpSp>
+      <p:grpSp>
+        <p:nvGrpSpPr>
+          <p:cNvPr id="33" name="Group 32"/>
+          <p:cNvGrpSpPr/>
           <p:nvPr/>
-        </p:nvSpPr>
-        <p:spPr>
+        </p:nvGrpSpPr>
+        <p:grpSpPr>
           <a:xfrm>
-            <a:off x="5949951" y="5340351"/>
-            <a:ext cx="3194050" cy="1517650"/>
+            <a:off x="6093654" y="1696172"/>
+            <a:ext cx="3238500" cy="3795582"/>
+            <a:chOff x="3555043" y="61545"/>
+            <a:chExt cx="3209576" cy="2123423"/>
           </a:xfrm>
-          <a:prstGeom prst="rect">
-            <a:avLst/>
-          </a:prstGeom>
-        </p:spPr>
-        <p:style>
-          <a:lnRef idx="2">
-            <a:schemeClr val="accent1">
-              <a:shade val="50000"/>
-            </a:schemeClr>
-          </a:lnRef>
-          <a:fillRef idx="1">
-            <a:schemeClr val="accent1"/>
-          </a:fillRef>
-          <a:effectRef idx="0">
-            <a:schemeClr val="accent1"/>
-          </a:effectRef>
-          <a:fontRef idx="minor">
-            <a:schemeClr val="lt1"/>
-          </a:fontRef>
-        </p:style>
-        <p:txBody>
-          <a:bodyPr rtlCol="0" anchor="ctr"/>
-          <a:lstStyle/>
-          <a:p>
-            <a:pPr algn="ctr"/>
-            <a:r>
-              <a:rPr lang="en-GB" dirty="0" smtClean="0"/>
-              <a:t>IMAGE?</a:t>
-            </a:r>
-            <a:endParaRPr lang="en-GB" dirty="0"/>
-          </a:p>
-        </p:txBody>
-      </p:sp>
-      <p:sp>
-        <p:nvSpPr>
-          <p:cNvPr id="12" name="Rectangle 11"/>
-          <p:cNvSpPr/>
+        </p:grpSpPr>
+        <p:sp>
+          <p:nvSpPr>
+            <p:cNvPr id="34" name="Rounded Rectangle 13"/>
+            <p:cNvSpPr/>
+            <p:nvPr/>
+          </p:nvSpPr>
+          <p:spPr>
+            <a:xfrm>
+              <a:off x="3809100" y="61545"/>
+              <a:ext cx="2718699" cy="2123423"/>
+            </a:xfrm>
+            <a:prstGeom prst="roundRect">
+              <a:avLst/>
+            </a:prstGeom>
+            <a:gradFill flip="none" rotWithShape="1">
+              <a:gsLst>
+                <a:gs pos="0">
+                  <a:schemeClr val="lt1">
+                    <a:shade val="30000"/>
+                    <a:satMod val="115000"/>
+                  </a:schemeClr>
+                </a:gs>
+                <a:gs pos="50000">
+                  <a:schemeClr val="lt1">
+                    <a:shade val="67500"/>
+                    <a:satMod val="115000"/>
+                  </a:schemeClr>
+                </a:gs>
+                <a:gs pos="100000">
+                  <a:schemeClr val="lt1">
+                    <a:shade val="100000"/>
+                    <a:satMod val="115000"/>
+                  </a:schemeClr>
+                </a:gs>
+              </a:gsLst>
+              <a:lin ang="10800000" scaled="1"/>
+              <a:tileRect/>
+            </a:gradFill>
+            <a:scene3d>
+              <a:camera prst="orthographicFront"/>
+              <a:lightRig rig="threePt" dir="t"/>
+            </a:scene3d>
+            <a:sp3d>
+              <a:bevelT prst="angle"/>
+            </a:sp3d>
+          </p:spPr>
+          <p:style>
+            <a:lnRef idx="2">
+              <a:schemeClr val="dk1"/>
+            </a:lnRef>
+            <a:fillRef idx="1">
+              <a:schemeClr val="lt1"/>
+            </a:fillRef>
+            <a:effectRef idx="0">
+              <a:schemeClr val="dk1"/>
+            </a:effectRef>
+            <a:fontRef idx="minor">
+              <a:schemeClr val="dk1"/>
+            </a:fontRef>
+          </p:style>
+          <p:txBody>
+            <a:bodyPr rtlCol="0" anchor="t"/>
+            <a:lstStyle/>
+            <a:p>
+              <a:pPr algn="ctr"/>
+              <a:endParaRPr lang="en-GB" sz="1600" dirty="0" smtClean="0"/>
+            </a:p>
+            <a:p>
+              <a:pPr algn="ctr"/>
+              <a:endParaRPr lang="en-GB" sz="2400" dirty="0" smtClean="0"/>
+            </a:p>
+            <a:p>
+              <a:pPr algn="ctr"/>
+              <a:r>
+                <a:rPr lang="en-GB" sz="1400" dirty="0" smtClean="0"/>
+                <a:t>There are plenty of reasons why Memori should be the next app you download. These include a simple and easy to use UI with a whole list of features. A new coveted feature found in apps called Dark Mode. A whole new way to share your adventurous holidays through a social media service where users can view others’ holidays. And many more!</a:t>
+              </a:r>
+              <a:endParaRPr lang="en-GB" sz="1400" dirty="0" smtClean="0"/>
+            </a:p>
+          </p:txBody>
+        </p:sp>
+        <p:sp>
+          <p:nvSpPr>
+            <p:cNvPr id="35" name="Rectangle 34"/>
+            <p:cNvSpPr/>
+            <p:nvPr/>
+          </p:nvSpPr>
+          <p:spPr>
+            <a:xfrm>
+              <a:off x="3555043" y="65870"/>
+              <a:ext cx="3209576" cy="438154"/>
+            </a:xfrm>
+            <a:prstGeom prst="roundRect">
+              <a:avLst/>
+            </a:prstGeom>
+            <a:noFill/>
+            <a:ln>
+              <a:noFill/>
+            </a:ln>
+            <a:scene3d>
+              <a:camera prst="orthographicFront"/>
+              <a:lightRig rig="threePt" dir="t"/>
+            </a:scene3d>
+            <a:sp3d>
+              <a:bevelT prst="angle"/>
+            </a:sp3d>
+          </p:spPr>
+          <p:txBody>
+            <a:bodyPr wrap="square" lIns="91440" tIns="45720" rIns="91440" bIns="45720">
+              <a:spAutoFit/>
+            </a:bodyPr>
+            <a:lstStyle/>
+            <a:p>
+              <a:pPr algn="ctr"/>
+              <a:r>
+                <a:rPr lang="en-US" sz="2000" dirty="0" smtClean="0">
+                  <a:ln w="18415" cmpd="sng">
+                    <a:solidFill>
+                      <a:srgbClr val="FFFFFF"/>
+                    </a:solidFill>
+                    <a:prstDash val="solid"/>
+                  </a:ln>
+                  <a:solidFill>
+                    <a:srgbClr val="FFFFFF"/>
+                  </a:solidFill>
+                  <a:effectLst>
+                    <a:outerShdw blurRad="63500" dir="3600000" algn="tl" rotWithShape="0">
+                      <a:srgbClr val="000000">
+                        <a:alpha val="70000"/>
+                      </a:srgbClr>
+                    </a:outerShdw>
+                  </a:effectLst>
+                </a:rPr>
+                <a:t>What makes Memori    better thank its rivals?</a:t>
+              </a:r>
+              <a:endParaRPr lang="en-US" sz="2000" dirty="0">
+                <a:ln w="18415" cmpd="sng">
+                  <a:solidFill>
+                    <a:srgbClr val="FFFFFF"/>
+                  </a:solidFill>
+                  <a:prstDash val="solid"/>
+                </a:ln>
+                <a:solidFill>
+                  <a:srgbClr val="FFFFFF"/>
+                </a:solidFill>
+                <a:effectLst>
+                  <a:outerShdw blurRad="63500" dir="3600000" algn="tl" rotWithShape="0">
+                    <a:srgbClr val="000000">
+                      <a:alpha val="70000"/>
+                    </a:srgbClr>
+                  </a:outerShdw>
+                </a:effectLst>
+              </a:endParaRPr>
+            </a:p>
+          </p:txBody>
+        </p:sp>
+      </p:grpSp>
+      <p:grpSp>
+        <p:nvGrpSpPr>
+          <p:cNvPr id="36" name="Group 35"/>
+          <p:cNvGrpSpPr/>
           <p:nvPr/>
-        </p:nvSpPr>
-        <p:spPr>
+        </p:nvGrpSpPr>
+        <p:grpSpPr>
           <a:xfrm>
-            <a:off x="2927350" y="4584700"/>
-            <a:ext cx="2844801" cy="2273300"/>
+            <a:off x="1" y="2095499"/>
+            <a:ext cx="2838450" cy="3019499"/>
+            <a:chOff x="3318224" y="-55728"/>
+            <a:chExt cx="3209576" cy="2218519"/>
           </a:xfrm>
-          <a:prstGeom prst="rect">
-            <a:avLst/>
-          </a:prstGeom>
-        </p:spPr>
-        <p:style>
-          <a:lnRef idx="2">
-            <a:schemeClr val="accent1">
-              <a:shade val="50000"/>
-            </a:schemeClr>
-          </a:lnRef>
-          <a:fillRef idx="1">
-            <a:schemeClr val="accent1"/>
-          </a:fillRef>
-          <a:effectRef idx="0">
-            <a:schemeClr val="accent1"/>
-          </a:effectRef>
-          <a:fontRef idx="minor">
-            <a:schemeClr val="lt1"/>
-          </a:fontRef>
-        </p:style>
-        <p:txBody>
-          <a:bodyPr rtlCol="0" anchor="ctr"/>
-          <a:lstStyle/>
-          <a:p>
-            <a:pPr algn="ctr"/>
-            <a:r>
-              <a:rPr lang="en-GB" dirty="0" smtClean="0"/>
-              <a:t>WHY CHOOSE MEMORI?</a:t>
-            </a:r>
-            <a:endParaRPr lang="en-GB" dirty="0"/>
-          </a:p>
-        </p:txBody>
-      </p:sp>
-      <p:sp>
-        <p:nvSpPr>
-          <p:cNvPr id="14" name="Rectangle 13"/>
-          <p:cNvSpPr/>
+        </p:grpSpPr>
+        <p:sp>
+          <p:nvSpPr>
+            <p:cNvPr id="37" name="Rounded Rectangle 13"/>
+            <p:cNvSpPr/>
+            <p:nvPr/>
+          </p:nvSpPr>
+          <p:spPr>
+            <a:xfrm>
+              <a:off x="3318224" y="-55728"/>
+              <a:ext cx="3209576" cy="2218519"/>
+            </a:xfrm>
+            <a:prstGeom prst="roundRect">
+              <a:avLst/>
+            </a:prstGeom>
+            <a:gradFill flip="none" rotWithShape="1">
+              <a:gsLst>
+                <a:gs pos="0">
+                  <a:schemeClr val="lt1">
+                    <a:shade val="30000"/>
+                    <a:satMod val="115000"/>
+                  </a:schemeClr>
+                </a:gs>
+                <a:gs pos="50000">
+                  <a:schemeClr val="lt1">
+                    <a:shade val="67500"/>
+                    <a:satMod val="115000"/>
+                  </a:schemeClr>
+                </a:gs>
+                <a:gs pos="100000">
+                  <a:schemeClr val="lt1">
+                    <a:shade val="100000"/>
+                    <a:satMod val="115000"/>
+                  </a:schemeClr>
+                </a:gs>
+              </a:gsLst>
+              <a:lin ang="0" scaled="1"/>
+              <a:tileRect/>
+            </a:gradFill>
+            <a:scene3d>
+              <a:camera prst="orthographicFront"/>
+              <a:lightRig rig="threePt" dir="t"/>
+            </a:scene3d>
+            <a:sp3d>
+              <a:bevelT prst="angle"/>
+            </a:sp3d>
+          </p:spPr>
+          <p:style>
+            <a:lnRef idx="2">
+              <a:schemeClr val="dk1"/>
+            </a:lnRef>
+            <a:fillRef idx="1">
+              <a:schemeClr val="lt1"/>
+            </a:fillRef>
+            <a:effectRef idx="0">
+              <a:schemeClr val="dk1"/>
+            </a:effectRef>
+            <a:fontRef idx="minor">
+              <a:schemeClr val="dk1"/>
+            </a:fontRef>
+          </p:style>
+          <p:txBody>
+            <a:bodyPr rtlCol="0" anchor="t"/>
+            <a:lstStyle/>
+            <a:p>
+              <a:pPr algn="ctr"/>
+              <a:endParaRPr lang="en-GB" sz="2000" dirty="0" smtClean="0"/>
+            </a:p>
+            <a:p>
+              <a:pPr algn="ctr"/>
+              <a:r>
+                <a:rPr lang="en-GB" sz="1400" dirty="0" smtClean="0"/>
+                <a:t>Memori can keep all of your holiday memories in a safe and in a reliable place, which you can access anywhere in the world. It could even tell you what to visit next on your journey. All this will be grouped in a single holiday, making it easier for you to track when you get home. And just in case you lose your phone, all the data is backed up to the cloud.</a:t>
+              </a:r>
+              <a:endParaRPr lang="en-GB" sz="1400" dirty="0" smtClean="0"/>
+            </a:p>
+          </p:txBody>
+        </p:sp>
+        <p:sp>
+          <p:nvSpPr>
+            <p:cNvPr id="38" name="Rectangle 37"/>
+            <p:cNvSpPr/>
+            <p:nvPr/>
+          </p:nvSpPr>
+          <p:spPr>
+            <a:xfrm>
+              <a:off x="3318224" y="8923"/>
+              <a:ext cx="3209576" cy="352450"/>
+            </a:xfrm>
+            <a:prstGeom prst="roundRect">
+              <a:avLst/>
+            </a:prstGeom>
+            <a:noFill/>
+            <a:ln>
+              <a:noFill/>
+            </a:ln>
+            <a:scene3d>
+              <a:camera prst="orthographicFront"/>
+              <a:lightRig rig="threePt" dir="t"/>
+            </a:scene3d>
+            <a:sp3d>
+              <a:bevelT prst="angle"/>
+            </a:sp3d>
+          </p:spPr>
+          <p:txBody>
+            <a:bodyPr wrap="square" lIns="91440" tIns="45720" rIns="91440" bIns="45720">
+              <a:spAutoFit/>
+            </a:bodyPr>
+            <a:lstStyle/>
+            <a:p>
+              <a:pPr algn="ctr"/>
+              <a:r>
+                <a:rPr lang="en-US" sz="2000" dirty="0" smtClean="0">
+                  <a:ln w="18415" cmpd="sng">
+                    <a:solidFill>
+                      <a:srgbClr val="FFFFFF"/>
+                    </a:solidFill>
+                    <a:prstDash val="solid"/>
+                  </a:ln>
+                  <a:solidFill>
+                    <a:srgbClr val="FFFFFF"/>
+                  </a:solidFill>
+                  <a:effectLst>
+                    <a:outerShdw blurRad="63500" dir="3600000" algn="tl" rotWithShape="0">
+                      <a:srgbClr val="000000">
+                        <a:alpha val="70000"/>
+                      </a:srgbClr>
+                    </a:outerShdw>
+                  </a:effectLst>
+                </a:rPr>
+                <a:t>What can Memori do?</a:t>
+              </a:r>
+              <a:endParaRPr lang="en-US" sz="2000" dirty="0">
+                <a:ln w="18415" cmpd="sng">
+                  <a:solidFill>
+                    <a:srgbClr val="FFFFFF"/>
+                  </a:solidFill>
+                  <a:prstDash val="solid"/>
+                </a:ln>
+                <a:solidFill>
+                  <a:srgbClr val="FFFFFF"/>
+                </a:solidFill>
+                <a:effectLst>
+                  <a:outerShdw blurRad="63500" dir="3600000" algn="tl" rotWithShape="0">
+                    <a:srgbClr val="000000">
+                      <a:alpha val="70000"/>
+                    </a:srgbClr>
+                  </a:outerShdw>
+                </a:effectLst>
+              </a:endParaRPr>
+            </a:p>
+          </p:txBody>
+        </p:sp>
+      </p:grpSp>
+      <p:grpSp>
+        <p:nvGrpSpPr>
+          <p:cNvPr id="39" name="Group 38"/>
+          <p:cNvGrpSpPr/>
           <p:nvPr/>
-        </p:nvSpPr>
-        <p:spPr>
+        </p:nvGrpSpPr>
+        <p:grpSpPr>
           <a:xfrm>
-            <a:off x="2927350" y="0"/>
-            <a:ext cx="2622564" cy="2095500"/>
+            <a:off x="3140424" y="4184650"/>
+            <a:ext cx="2871430" cy="2673351"/>
+            <a:chOff x="3318224" y="-16843"/>
+            <a:chExt cx="3209576" cy="2112345"/>
           </a:xfrm>
-          <a:prstGeom prst="rect">
-            <a:avLst/>
-          </a:prstGeom>
-        </p:spPr>
-        <p:style>
-          <a:lnRef idx="2">
-            <a:schemeClr val="accent1">
-              <a:shade val="50000"/>
-            </a:schemeClr>
-          </a:lnRef>
-          <a:fillRef idx="1">
-            <a:schemeClr val="accent1"/>
-          </a:fillRef>
-          <a:effectRef idx="0">
-            <a:schemeClr val="accent1"/>
-          </a:effectRef>
-          <a:fontRef idx="minor">
-            <a:schemeClr val="lt1"/>
-          </a:fontRef>
-        </p:style>
-        <p:txBody>
-          <a:bodyPr rtlCol="0" anchor="ctr"/>
-          <a:lstStyle/>
-          <a:p>
-            <a:pPr algn="ctr"/>
-            <a:r>
-              <a:rPr lang="en-GB" dirty="0" smtClean="0"/>
-              <a:t>WHAT IS </a:t>
-            </a:r>
-            <a:r>
-              <a:rPr lang="en-GB" dirty="0" smtClean="0"/>
-              <a:t>MEMORI</a:t>
-            </a:r>
-          </a:p>
-        </p:txBody>
-      </p:sp>
+        </p:grpSpPr>
+        <p:sp>
+          <p:nvSpPr>
+            <p:cNvPr id="40" name="Rounded Rectangle 13"/>
+            <p:cNvSpPr/>
+            <p:nvPr/>
+          </p:nvSpPr>
+          <p:spPr>
+            <a:xfrm>
+              <a:off x="3318224" y="-16843"/>
+              <a:ext cx="3209576" cy="2112345"/>
+            </a:xfrm>
+            <a:prstGeom prst="roundRect">
+              <a:avLst/>
+            </a:prstGeom>
+            <a:gradFill flip="none" rotWithShape="1">
+              <a:gsLst>
+                <a:gs pos="0">
+                  <a:schemeClr val="lt1">
+                    <a:shade val="30000"/>
+                    <a:satMod val="115000"/>
+                  </a:schemeClr>
+                </a:gs>
+                <a:gs pos="50000">
+                  <a:schemeClr val="lt1">
+                    <a:shade val="67500"/>
+                    <a:satMod val="115000"/>
+                  </a:schemeClr>
+                </a:gs>
+                <a:gs pos="100000">
+                  <a:schemeClr val="lt1">
+                    <a:shade val="100000"/>
+                    <a:satMod val="115000"/>
+                  </a:schemeClr>
+                </a:gs>
+              </a:gsLst>
+              <a:lin ang="16200000" scaled="1"/>
+              <a:tileRect/>
+            </a:gradFill>
+            <a:scene3d>
+              <a:camera prst="orthographicFront"/>
+              <a:lightRig rig="threePt" dir="t"/>
+            </a:scene3d>
+            <a:sp3d>
+              <a:bevelT prst="angle"/>
+            </a:sp3d>
+          </p:spPr>
+          <p:style>
+            <a:lnRef idx="2">
+              <a:schemeClr val="dk1"/>
+            </a:lnRef>
+            <a:fillRef idx="1">
+              <a:schemeClr val="lt1"/>
+            </a:fillRef>
+            <a:effectRef idx="0">
+              <a:schemeClr val="dk1"/>
+            </a:effectRef>
+            <a:fontRef idx="minor">
+              <a:schemeClr val="dk1"/>
+            </a:fontRef>
+          </p:style>
+          <p:txBody>
+            <a:bodyPr rtlCol="0" anchor="t"/>
+            <a:lstStyle/>
+            <a:p>
+              <a:pPr algn="ctr"/>
+              <a:endParaRPr lang="en-GB" sz="2000" dirty="0" smtClean="0"/>
+            </a:p>
+            <a:p>
+              <a:pPr algn="ctr"/>
+              <a:r>
+                <a:rPr lang="en-GB" sz="1400" dirty="0" smtClean="0"/>
+                <a:t>Memori will be the next ground-breaking app that everyone will talk about when travelling. Many of the current alternatives do not provide such a wide array of services, which is why I believe this app will be the first of its  kind. Memori will revolutionize the way holidays are kept and shared!</a:t>
+              </a:r>
+              <a:endParaRPr lang="en-GB" sz="1400" dirty="0" smtClean="0"/>
+            </a:p>
+          </p:txBody>
+        </p:sp>
+        <p:sp>
+          <p:nvSpPr>
+            <p:cNvPr id="41" name="Rectangle 40"/>
+            <p:cNvSpPr/>
+            <p:nvPr/>
+          </p:nvSpPr>
+          <p:spPr>
+            <a:xfrm>
+              <a:off x="3318224" y="15695"/>
+              <a:ext cx="3209576" cy="702576"/>
+            </a:xfrm>
+            <a:prstGeom prst="roundRect">
+              <a:avLst/>
+            </a:prstGeom>
+            <a:noFill/>
+            <a:ln>
+              <a:noFill/>
+            </a:ln>
+            <a:scene3d>
+              <a:camera prst="orthographicFront"/>
+              <a:lightRig rig="threePt" dir="t"/>
+            </a:scene3d>
+            <a:sp3d>
+              <a:bevelT prst="angle"/>
+            </a:sp3d>
+          </p:spPr>
+          <p:txBody>
+            <a:bodyPr wrap="square" lIns="91440" tIns="45720" rIns="91440" bIns="45720">
+              <a:spAutoFit/>
+            </a:bodyPr>
+            <a:lstStyle/>
+            <a:p>
+              <a:pPr algn="ctr"/>
+              <a:r>
+                <a:rPr lang="en-US" sz="2000" dirty="0" smtClean="0">
+                  <a:ln w="18415" cmpd="sng">
+                    <a:solidFill>
+                      <a:srgbClr val="FFFFFF"/>
+                    </a:solidFill>
+                    <a:prstDash val="solid"/>
+                  </a:ln>
+                  <a:solidFill>
+                    <a:srgbClr val="FFFFFF"/>
+                  </a:solidFill>
+                  <a:effectLst>
+                    <a:outerShdw blurRad="63500" dir="3600000" algn="tl" rotWithShape="0">
+                      <a:srgbClr val="000000">
+                        <a:alpha val="70000"/>
+                      </a:srgbClr>
+                    </a:outerShdw>
+                  </a:effectLst>
+                </a:rPr>
+                <a:t>Why choose Memori?</a:t>
+              </a:r>
+              <a:endParaRPr lang="en-US" sz="2000" dirty="0">
+                <a:ln w="18415" cmpd="sng">
+                  <a:solidFill>
+                    <a:srgbClr val="FFFFFF"/>
+                  </a:solidFill>
+                  <a:prstDash val="solid"/>
+                </a:ln>
+                <a:solidFill>
+                  <a:srgbClr val="FFFFFF"/>
+                </a:solidFill>
+                <a:effectLst>
+                  <a:outerShdw blurRad="63500" dir="3600000" algn="tl" rotWithShape="0">
+                    <a:srgbClr val="000000">
+                      <a:alpha val="70000"/>
+                    </a:srgbClr>
+                  </a:outerShdw>
+                </a:effectLst>
+              </a:endParaRPr>
+            </a:p>
+          </p:txBody>
+        </p:sp>
+      </p:grpSp>
     </p:spTree>
   </p:cSld>
   <p:clrMapOvr>
     <a:masterClrMapping/>
   </p:clrMapOvr>
+  <p:timing>
+    <p:tnLst>
+      <p:par>
+        <p:cTn id="1" dur="indefinite" restart="never" nodeType="tmRoot"/>
+      </p:par>
+    </p:tnLst>
+  </p:timing>
 </p:sld>
 </file>
 
@@ -3797,4 +4745,287 @@
   <a:objectDefaults/>
   <a:extraClrSchemeLst/>
 </a:theme>
+</file>
+
+<file path=ppt/theme/theme2.xml><?xml version="1.0" encoding="utf-8"?>
+<a:theme xmlns:a="http://schemas.openxmlformats.org/drawingml/2006/main" name="Office Theme">
+  <a:themeElements>
+    <a:clrScheme name="Office">
+      <a:dk1>
+        <a:sysClr val="windowText" lastClr="000000"/>
+      </a:dk1>
+      <a:lt1>
+        <a:sysClr val="window" lastClr="FFFFFF"/>
+      </a:lt1>
+      <a:dk2>
+        <a:srgbClr val="1F497D"/>
+      </a:dk2>
+      <a:lt2>
+        <a:srgbClr val="EEECE1"/>
+      </a:lt2>
+      <a:accent1>
+        <a:srgbClr val="4F81BD"/>
+      </a:accent1>
+      <a:accent2>
+        <a:srgbClr val="C0504D"/>
+      </a:accent2>
+      <a:accent3>
+        <a:srgbClr val="9BBB59"/>
+      </a:accent3>
+      <a:accent4>
+        <a:srgbClr val="8064A2"/>
+      </a:accent4>
+      <a:accent5>
+        <a:srgbClr val="4BACC6"/>
+      </a:accent5>
+      <a:accent6>
+        <a:srgbClr val="F79646"/>
+      </a:accent6>
+      <a:hlink>
+        <a:srgbClr val="0000FF"/>
+      </a:hlink>
+      <a:folHlink>
+        <a:srgbClr val="800080"/>
+      </a:folHlink>
+    </a:clrScheme>
+    <a:fontScheme name="Office">
+      <a:majorFont>
+        <a:latin typeface="Calibri"/>
+        <a:ea typeface=""/>
+        <a:cs typeface=""/>
+        <a:font script="Jpan" typeface="ＭＳ Ｐゴシック"/>
+        <a:font script="Hang" typeface="맑은 고딕"/>
+        <a:font script="Hans" typeface="宋体"/>
+        <a:font script="Hant" typeface="新細明體"/>
+        <a:font script="Arab" typeface="Times New Roman"/>
+        <a:font script="Hebr" typeface="Times New Roman"/>
+        <a:font script="Thai" typeface="Angsana New"/>
+        <a:font script="Ethi" typeface="Nyala"/>
+        <a:font script="Beng" typeface="Vrinda"/>
+        <a:font script="Gujr" typeface="Shruti"/>
+        <a:font script="Khmr" typeface="MoolBoran"/>
+        <a:font script="Knda" typeface="Tunga"/>
+        <a:font script="Guru" typeface="Raavi"/>
+        <a:font script="Cans" typeface="Euphemia"/>
+        <a:font script="Cher" typeface="Plantagenet Cherokee"/>
+        <a:font script="Yiii" typeface="Microsoft Yi Baiti"/>
+        <a:font script="Tibt" typeface="Microsoft Himalaya"/>
+        <a:font script="Thaa" typeface="MV Boli"/>
+        <a:font script="Deva" typeface="Mangal"/>
+        <a:font script="Telu" typeface="Gautami"/>
+        <a:font script="Taml" typeface="Latha"/>
+        <a:font script="Syrc" typeface="Estrangelo Edessa"/>
+        <a:font script="Orya" typeface="Kalinga"/>
+        <a:font script="Mlym" typeface="Kartika"/>
+        <a:font script="Laoo" typeface="DokChampa"/>
+        <a:font script="Sinh" typeface="Iskoola Pota"/>
+        <a:font script="Mong" typeface="Mongolian Baiti"/>
+        <a:font script="Viet" typeface="Times New Roman"/>
+        <a:font script="Uigh" typeface="Microsoft Uighur"/>
+      </a:majorFont>
+      <a:minorFont>
+        <a:latin typeface="Calibri"/>
+        <a:ea typeface=""/>
+        <a:cs typeface=""/>
+        <a:font script="Jpan" typeface="ＭＳ Ｐゴシック"/>
+        <a:font script="Hang" typeface="맑은 고딕"/>
+        <a:font script="Hans" typeface="宋体"/>
+        <a:font script="Hant" typeface="新細明體"/>
+        <a:font script="Arab" typeface="Arial"/>
+        <a:font script="Hebr" typeface="Arial"/>
+        <a:font script="Thai" typeface="Cordia New"/>
+        <a:font script="Ethi" typeface="Nyala"/>
+        <a:font script="Beng" typeface="Vrinda"/>
+        <a:font script="Gujr" typeface="Shruti"/>
+        <a:font script="Khmr" typeface="DaunPenh"/>
+        <a:font script="Knda" typeface="Tunga"/>
+        <a:font script="Guru" typeface="Raavi"/>
+        <a:font script="Cans" typeface="Euphemia"/>
+        <a:font script="Cher" typeface="Plantagenet Cherokee"/>
+        <a:font script="Yiii" typeface="Microsoft Yi Baiti"/>
+        <a:font script="Tibt" typeface="Microsoft Himalaya"/>
+        <a:font script="Thaa" typeface="MV Boli"/>
+        <a:font script="Deva" typeface="Mangal"/>
+        <a:font script="Telu" typeface="Gautami"/>
+        <a:font script="Taml" typeface="Latha"/>
+        <a:font script="Syrc" typeface="Estrangelo Edessa"/>
+        <a:font script="Orya" typeface="Kalinga"/>
+        <a:font script="Mlym" typeface="Kartika"/>
+        <a:font script="Laoo" typeface="DokChampa"/>
+        <a:font script="Sinh" typeface="Iskoola Pota"/>
+        <a:font script="Mong" typeface="Mongolian Baiti"/>
+        <a:font script="Viet" typeface="Arial"/>
+        <a:font script="Uigh" typeface="Microsoft Uighur"/>
+      </a:minorFont>
+    </a:fontScheme>
+    <a:fmtScheme name="Office">
+      <a:fillStyleLst>
+        <a:solidFill>
+          <a:schemeClr val="phClr"/>
+        </a:solidFill>
+        <a:gradFill rotWithShape="1">
+          <a:gsLst>
+            <a:gs pos="0">
+              <a:schemeClr val="phClr">
+                <a:tint val="50000"/>
+                <a:satMod val="300000"/>
+              </a:schemeClr>
+            </a:gs>
+            <a:gs pos="35000">
+              <a:schemeClr val="phClr">
+                <a:tint val="37000"/>
+                <a:satMod val="300000"/>
+              </a:schemeClr>
+            </a:gs>
+            <a:gs pos="100000">
+              <a:schemeClr val="phClr">
+                <a:tint val="15000"/>
+                <a:satMod val="350000"/>
+              </a:schemeClr>
+            </a:gs>
+          </a:gsLst>
+          <a:lin ang="16200000" scaled="1"/>
+        </a:gradFill>
+        <a:gradFill rotWithShape="1">
+          <a:gsLst>
+            <a:gs pos="0">
+              <a:schemeClr val="phClr">
+                <a:shade val="51000"/>
+                <a:satMod val="130000"/>
+              </a:schemeClr>
+            </a:gs>
+            <a:gs pos="80000">
+              <a:schemeClr val="phClr">
+                <a:shade val="93000"/>
+                <a:satMod val="130000"/>
+              </a:schemeClr>
+            </a:gs>
+            <a:gs pos="100000">
+              <a:schemeClr val="phClr">
+                <a:shade val="94000"/>
+                <a:satMod val="135000"/>
+              </a:schemeClr>
+            </a:gs>
+          </a:gsLst>
+          <a:lin ang="16200000" scaled="0"/>
+        </a:gradFill>
+      </a:fillStyleLst>
+      <a:lnStyleLst>
+        <a:ln w="9525" cap="flat" cmpd="sng" algn="ctr">
+          <a:solidFill>
+            <a:schemeClr val="phClr">
+              <a:shade val="95000"/>
+              <a:satMod val="105000"/>
+            </a:schemeClr>
+          </a:solidFill>
+          <a:prstDash val="solid"/>
+        </a:ln>
+        <a:ln w="25400" cap="flat" cmpd="sng" algn="ctr">
+          <a:solidFill>
+            <a:schemeClr val="phClr"/>
+          </a:solidFill>
+          <a:prstDash val="solid"/>
+        </a:ln>
+        <a:ln w="38100" cap="flat" cmpd="sng" algn="ctr">
+          <a:solidFill>
+            <a:schemeClr val="phClr"/>
+          </a:solidFill>
+          <a:prstDash val="solid"/>
+        </a:ln>
+      </a:lnStyleLst>
+      <a:effectStyleLst>
+        <a:effectStyle>
+          <a:effectLst>
+            <a:outerShdw blurRad="40000" dist="20000" dir="5400000" rotWithShape="0">
+              <a:srgbClr val="000000">
+                <a:alpha val="38000"/>
+              </a:srgbClr>
+            </a:outerShdw>
+          </a:effectLst>
+        </a:effectStyle>
+        <a:effectStyle>
+          <a:effectLst>
+            <a:outerShdw blurRad="40000" dist="23000" dir="5400000" rotWithShape="0">
+              <a:srgbClr val="000000">
+                <a:alpha val="35000"/>
+              </a:srgbClr>
+            </a:outerShdw>
+          </a:effectLst>
+        </a:effectStyle>
+        <a:effectStyle>
+          <a:effectLst>
+            <a:outerShdw blurRad="40000" dist="23000" dir="5400000" rotWithShape="0">
+              <a:srgbClr val="000000">
+                <a:alpha val="35000"/>
+              </a:srgbClr>
+            </a:outerShdw>
+          </a:effectLst>
+          <a:scene3d>
+            <a:camera prst="orthographicFront">
+              <a:rot lat="0" lon="0" rev="0"/>
+            </a:camera>
+            <a:lightRig rig="threePt" dir="t">
+              <a:rot lat="0" lon="0" rev="1200000"/>
+            </a:lightRig>
+          </a:scene3d>
+          <a:sp3d>
+            <a:bevelT w="63500" h="25400"/>
+          </a:sp3d>
+        </a:effectStyle>
+      </a:effectStyleLst>
+      <a:bgFillStyleLst>
+        <a:solidFill>
+          <a:schemeClr val="phClr"/>
+        </a:solidFill>
+        <a:gradFill rotWithShape="1">
+          <a:gsLst>
+            <a:gs pos="0">
+              <a:schemeClr val="phClr">
+                <a:tint val="40000"/>
+                <a:satMod val="350000"/>
+              </a:schemeClr>
+            </a:gs>
+            <a:gs pos="40000">
+              <a:schemeClr val="phClr">
+                <a:tint val="45000"/>
+                <a:shade val="99000"/>
+                <a:satMod val="350000"/>
+              </a:schemeClr>
+            </a:gs>
+            <a:gs pos="100000">
+              <a:schemeClr val="phClr">
+                <a:shade val="20000"/>
+                <a:satMod val="255000"/>
+              </a:schemeClr>
+            </a:gs>
+          </a:gsLst>
+          <a:path path="circle">
+            <a:fillToRect l="50000" t="-80000" r="50000" b="180000"/>
+          </a:path>
+        </a:gradFill>
+        <a:gradFill rotWithShape="1">
+          <a:gsLst>
+            <a:gs pos="0">
+              <a:schemeClr val="phClr">
+                <a:tint val="80000"/>
+                <a:satMod val="300000"/>
+              </a:schemeClr>
+            </a:gs>
+            <a:gs pos="100000">
+              <a:schemeClr val="phClr">
+                <a:shade val="30000"/>
+                <a:satMod val="200000"/>
+              </a:schemeClr>
+            </a:gs>
+          </a:gsLst>
+          <a:path path="circle">
+            <a:fillToRect l="50000" t="50000" r="50000" b="50000"/>
+          </a:path>
+        </a:gradFill>
+      </a:bgFillStyleLst>
+    </a:fmtScheme>
+  </a:themeElements>
+  <a:objectDefaults/>
+  <a:extraClrSchemeLst/>
+</a:theme>
 </file>
</xml_diff>